<commit_message>
* Changes code image;
</commit_message>
<xml_diff>
--- a/Apresentações/A39378_XsdToJavaApi_Apresentacao_intercalar.pptx
+++ b/Apresentações/A39378_XsdToJavaApi_Apresentacao_intercalar.pptx
@@ -9273,15 +9273,7 @@
                   <a:schemeClr val="tx1"/>
                 </a:solidFill>
               </a:rPr>
-              <a:t>sintaxes movendo o template para </a:t>
-            </a:r>
-            <a:r>
-              <a:rPr lang="pt-PT" sz="2700" dirty="0" smtClean="0">
-                <a:solidFill>
-                  <a:schemeClr val="tx1"/>
-                </a:solidFill>
-              </a:rPr>
-              <a:t>Java</a:t>
+              <a:t>sintaxes movendo o template para Java</a:t>
             </a:r>
           </a:p>
           <a:p>
@@ -9322,11 +9314,6 @@
               </a:rPr>
               <a:t>regras da linguagem</a:t>
             </a:r>
-            <a:endParaRPr lang="pt-PT" sz="2700" dirty="0">
-              <a:solidFill>
-                <a:schemeClr val="tx1"/>
-              </a:solidFill>
-            </a:endParaRPr>
           </a:p>
         </p:txBody>
       </p:sp>
@@ -10254,7 +10241,7 @@
       </p:pic>
       <p:pic>
         <p:nvPicPr>
-          <p:cNvPr id="20" name="Picture 19"/>
+          <p:cNvPr id="2" name="Picture 1"/>
           <p:cNvPicPr>
             <a:picLocks noChangeAspect="1"/>
           </p:cNvPicPr>
@@ -10274,8 +10261,8 @@
         </p:blipFill>
         <p:spPr>
           <a:xfrm>
-            <a:off x="4918269" y="3279570"/>
-            <a:ext cx="3251329" cy="3031078"/>
+            <a:off x="4893568" y="3249227"/>
+            <a:ext cx="3300732" cy="3004259"/>
           </a:xfrm>
           <a:prstGeom prst="rect">
             <a:avLst/>
@@ -10576,33 +10563,6 @@
                                         </p:cTn>
                                         <p:tgtEl>
                                           <p:spTgt spid="12"/>
-                                        </p:tgtEl>
-                                        <p:attrNameLst>
-                                          <p:attrName>style.visibility</p:attrName>
-                                        </p:attrNameLst>
-                                      </p:cBhvr>
-                                      <p:to>
-                                        <p:strVal val="visible"/>
-                                      </p:to>
-                                    </p:set>
-                                  </p:childTnLst>
-                                </p:cTn>
-                              </p:par>
-                              <p:par>
-                                <p:cTn id="27" presetID="1" presetClass="entr" presetSubtype="0" fill="hold" nodeType="withEffect">
-                                  <p:stCondLst>
-                                    <p:cond delay="0"/>
-                                  </p:stCondLst>
-                                  <p:childTnLst>
-                                    <p:set>
-                                      <p:cBhvr>
-                                        <p:cTn id="28" dur="1" fill="hold">
-                                          <p:stCondLst>
-                                            <p:cond delay="0"/>
-                                          </p:stCondLst>
-                                        </p:cTn>
-                                        <p:tgtEl>
-                                          <p:spTgt spid="20"/>
                                         </p:tgtEl>
                                         <p:attrNameLst>
                                           <p:attrName>style.visibility</p:attrName>

</xml_diff>